<commit_message>
Suunnitelma päivitetty: ekan demon pvm, Jeremiaksen tiedot
</commit_message>
<xml_diff>
--- a/documents/SWD4TN024-3_Suunta-ohjelmistoprojektin-suunnitelma.pptx
+++ b/documents/SWD4TN024-3_Suunta-ohjelmistoprojektin-suunnitelma.pptx
@@ -245,7 +245,7 @@
           <a:p>
             <a:fld id="{96E829A5-98CF-47D2-94E3-AC4DF053950D}" type="datetimeFigureOut">
               <a:rPr lang="fi-FI" smtClean="0"/>
-              <a:t>23.1.2018</a:t>
+              <a:t>30.1.2018</a:t>
             </a:fld>
             <a:endParaRPr lang="fi-FI"/>
           </a:p>
@@ -1238,7 +1238,7 @@
           <a:p>
             <a:fld id="{DE20D116-D477-456D-A801-94D4F4EBF984}" type="datetime1">
               <a:rPr lang="fi-FI" smtClean="0"/>
-              <a:t>23.1.2018</a:t>
+              <a:t>30.1.2018</a:t>
             </a:fld>
             <a:endParaRPr lang="fi-FI" dirty="0"/>
           </a:p>
@@ -1401,7 +1401,7 @@
           <a:p>
             <a:fld id="{E5BE346D-57A8-433D-B9CE-10BA33C3DBDE}" type="datetime1">
               <a:rPr lang="fi-FI" smtClean="0"/>
-              <a:t>23.1.2018</a:t>
+              <a:t>30.1.2018</a:t>
             </a:fld>
             <a:endParaRPr lang="fi-FI"/>
           </a:p>
@@ -1609,7 +1609,7 @@
           <a:p>
             <a:fld id="{6CE42621-B62D-4857-B104-021C14916541}" type="datetime1">
               <a:rPr lang="fi-FI" smtClean="0"/>
-              <a:t>23.1.2018</a:t>
+              <a:t>30.1.2018</a:t>
             </a:fld>
             <a:endParaRPr lang="fi-FI"/>
           </a:p>
@@ -1874,7 +1874,7 @@
           <a:p>
             <a:fld id="{8271E7A0-67E3-4A31-B7CF-A486873999E7}" type="datetime1">
               <a:rPr lang="fi-FI" smtClean="0"/>
-              <a:t>23.1.2018</a:t>
+              <a:t>30.1.2018</a:t>
             </a:fld>
             <a:endParaRPr lang="fi-FI"/>
           </a:p>
@@ -2103,7 +2103,7 @@
           <a:p>
             <a:fld id="{28A60903-2CB5-49A3-BFDE-AE00FF49E552}" type="datetime1">
               <a:rPr lang="fi-FI" smtClean="0"/>
-              <a:t>23.1.2018</a:t>
+              <a:t>30.1.2018</a:t>
             </a:fld>
             <a:endParaRPr lang="fi-FI"/>
           </a:p>
@@ -2288,7 +2288,7 @@
           <a:p>
             <a:fld id="{F52256CF-ED63-465F-993B-A2ABD3B7C8A3}" type="datetime1">
               <a:rPr lang="fi-FI" smtClean="0"/>
-              <a:t>23.1.2018</a:t>
+              <a:t>30.1.2018</a:t>
             </a:fld>
             <a:endParaRPr lang="fi-FI"/>
           </a:p>
@@ -2604,7 +2604,7 @@
           <a:p>
             <a:fld id="{4508329C-439F-40FE-8349-E8811DA1813F}" type="datetime1">
               <a:rPr lang="fi-FI" smtClean="0"/>
-              <a:t>23.1.2018</a:t>
+              <a:t>30.1.2018</a:t>
             </a:fld>
             <a:endParaRPr lang="fi-FI"/>
           </a:p>
@@ -3059,7 +3059,7 @@
           <a:p>
             <a:fld id="{791349BE-D8C8-4214-A75C-D361CA07A807}" type="datetime1">
               <a:rPr lang="fi-FI" smtClean="0"/>
-              <a:t>23.1.2018</a:t>
+              <a:t>30.1.2018</a:t>
             </a:fld>
             <a:endParaRPr lang="fi-FI"/>
           </a:p>
@@ -3205,7 +3205,7 @@
           <a:p>
             <a:fld id="{2DBAFC4A-15F0-4823-9BD7-F5DA84AD01BC}" type="datetime1">
               <a:rPr lang="fi-FI" smtClean="0"/>
-              <a:t>23.1.2018</a:t>
+              <a:t>30.1.2018</a:t>
             </a:fld>
             <a:endParaRPr lang="fi-FI"/>
           </a:p>
@@ -3328,7 +3328,7 @@
           <a:p>
             <a:fld id="{F327DE7A-45CD-469E-81BF-1488599C1E85}" type="datetime1">
               <a:rPr lang="fi-FI" smtClean="0"/>
-              <a:t>23.1.2018</a:t>
+              <a:t>30.1.2018</a:t>
             </a:fld>
             <a:endParaRPr lang="fi-FI"/>
           </a:p>
@@ -3633,7 +3633,7 @@
           <a:p>
             <a:fld id="{127536A2-F936-4795-B6CC-5E8425D21C9F}" type="datetime1">
               <a:rPr lang="fi-FI" smtClean="0"/>
-              <a:t>23.1.2018</a:t>
+              <a:t>30.1.2018</a:t>
             </a:fld>
             <a:endParaRPr lang="fi-FI"/>
           </a:p>
@@ -3919,7 +3919,7 @@
           <a:p>
             <a:fld id="{9D958096-889F-4808-B801-11E986A8A47F}" type="datetime1">
               <a:rPr lang="fi-FI" smtClean="0"/>
-              <a:t>23.1.2018</a:t>
+              <a:t>30.1.2018</a:t>
             </a:fld>
             <a:endParaRPr lang="fi-FI"/>
           </a:p>
@@ -4051,14 +4051,14 @@
           </a:ln>
           <a:extLst>
             <a:ext uri="{909E8E84-426E-40dd-AFC4-6F175D3DCCD1}">
-              <a14:hiddenFill xmlns:a14="http://schemas.microsoft.com/office/drawing/2010/main" xmlns="">
+              <a14:hiddenFill xmlns="" xmlns:a14="http://schemas.microsoft.com/office/drawing/2010/main">
                 <a:solidFill>
                   <a:schemeClr val="accent1"/>
                 </a:solidFill>
               </a14:hiddenFill>
             </a:ext>
             <a:ext uri="{91240B29-F687-4f45-9708-019B960494DF}">
-              <a14:hiddenLine xmlns:a14="http://schemas.microsoft.com/office/drawing/2010/main" xmlns="" w="9525">
+              <a14:hiddenLine xmlns="" xmlns:a14="http://schemas.microsoft.com/office/drawing/2010/main" w="9525">
                 <a:solidFill>
                   <a:schemeClr val="tx1"/>
                 </a:solidFill>
@@ -4110,14 +4110,14 @@
           </a:ln>
           <a:extLst>
             <a:ext uri="{909E8E84-426E-40dd-AFC4-6F175D3DCCD1}">
-              <a14:hiddenFill xmlns:a14="http://schemas.microsoft.com/office/drawing/2010/main" xmlns="">
+              <a14:hiddenFill xmlns="" xmlns:a14="http://schemas.microsoft.com/office/drawing/2010/main">
                 <a:solidFill>
                   <a:schemeClr val="accent1"/>
                 </a:solidFill>
               </a14:hiddenFill>
             </a:ext>
             <a:ext uri="{91240B29-F687-4f45-9708-019B960494DF}">
-              <a14:hiddenLine xmlns:a14="http://schemas.microsoft.com/office/drawing/2010/main" xmlns="" w="9525">
+              <a14:hiddenLine xmlns="" xmlns:a14="http://schemas.microsoft.com/office/drawing/2010/main" w="9525">
                 <a:solidFill>
                   <a:schemeClr val="tx1"/>
                 </a:solidFill>
@@ -4197,14 +4197,14 @@
           </a:ln>
           <a:extLst>
             <a:ext uri="{909E8E84-426E-40dd-AFC4-6F175D3DCCD1}">
-              <a14:hiddenFill xmlns:a14="http://schemas.microsoft.com/office/drawing/2010/main" xmlns="">
+              <a14:hiddenFill xmlns="" xmlns:a14="http://schemas.microsoft.com/office/drawing/2010/main">
                 <a:solidFill>
                   <a:schemeClr val="accent1"/>
                 </a:solidFill>
               </a14:hiddenFill>
             </a:ext>
             <a:ext uri="{91240B29-F687-4f45-9708-019B960494DF}">
-              <a14:hiddenLine xmlns:a14="http://schemas.microsoft.com/office/drawing/2010/main" xmlns="" w="9525">
+              <a14:hiddenLine xmlns="" xmlns:a14="http://schemas.microsoft.com/office/drawing/2010/main" w="9525">
                 <a:solidFill>
                   <a:schemeClr val="tx1"/>
                 </a:solidFill>
@@ -4235,7 +4235,7 @@
           <a:p>
             <a:fld id="{A31DF198-060F-4AAF-B240-863DC1F875CB}" type="datetime1">
               <a:rPr lang="fi-FI" smtClean="0"/>
-              <a:t>23.1.2018</a:t>
+              <a:t>30.1.2018</a:t>
             </a:fld>
             <a:endParaRPr lang="fi-FI" dirty="0"/>
           </a:p>
@@ -4265,14 +4265,14 @@
           </a:ln>
           <a:extLst>
             <a:ext uri="{909E8E84-426E-40dd-AFC4-6F175D3DCCD1}">
-              <a14:hiddenFill xmlns:a14="http://schemas.microsoft.com/office/drawing/2010/main" xmlns="">
+              <a14:hiddenFill xmlns="" xmlns:a14="http://schemas.microsoft.com/office/drawing/2010/main">
                 <a:solidFill>
                   <a:schemeClr val="accent1"/>
                 </a:solidFill>
               </a14:hiddenFill>
             </a:ext>
             <a:ext uri="{91240B29-F687-4f45-9708-019B960494DF}">
-              <a14:hiddenLine xmlns:a14="http://schemas.microsoft.com/office/drawing/2010/main" xmlns="" w="9525">
+              <a14:hiddenLine xmlns="" xmlns:a14="http://schemas.microsoft.com/office/drawing/2010/main" w="9525">
                 <a:solidFill>
                   <a:schemeClr val="tx1"/>
                 </a:solidFill>
@@ -4348,7 +4348,7 @@
             </a:ln>
             <a:extLst>
               <a:ext uri="{91240B29-F687-4f45-9708-019B960494DF}">
-                <a14:hiddenLine xmlns:a14="http://schemas.microsoft.com/office/drawing/2010/main" xmlns="" w="9525">
+                <a14:hiddenLine xmlns="" xmlns:a14="http://schemas.microsoft.com/office/drawing/2010/main" w="9525">
                   <a:solidFill>
                     <a:schemeClr val="tx1"/>
                   </a:solidFill>
@@ -4500,7 +4500,7 @@
             </a:ln>
             <a:extLst>
               <a:ext uri="{91240B29-F687-4f45-9708-019B960494DF}">
-                <a14:hiddenLine xmlns:a14="http://schemas.microsoft.com/office/drawing/2010/main" xmlns="" w="9525">
+                <a14:hiddenLine xmlns="" xmlns:a14="http://schemas.microsoft.com/office/drawing/2010/main" w="9525">
                   <a:solidFill>
                     <a:schemeClr val="tx1"/>
                   </a:solidFill>
@@ -4652,7 +4652,7 @@
             </a:ln>
             <a:extLst>
               <a:ext uri="{91240B29-F687-4f45-9708-019B960494DF}">
-                <a14:hiddenLine xmlns:a14="http://schemas.microsoft.com/office/drawing/2010/main" xmlns="" w="9525">
+                <a14:hiddenLine xmlns="" xmlns:a14="http://schemas.microsoft.com/office/drawing/2010/main" w="9525">
                   <a:solidFill>
                     <a:schemeClr val="tx1"/>
                   </a:solidFill>
@@ -4804,7 +4804,7 @@
             </a:ln>
             <a:extLst>
               <a:ext uri="{91240B29-F687-4f45-9708-019B960494DF}">
-                <a14:hiddenLine xmlns:a14="http://schemas.microsoft.com/office/drawing/2010/main" xmlns="" w="9525">
+                <a14:hiddenLine xmlns="" xmlns:a14="http://schemas.microsoft.com/office/drawing/2010/main" w="9525">
                   <a:solidFill>
                     <a:schemeClr val="tx1"/>
                   </a:solidFill>
@@ -4956,7 +4956,7 @@
             </a:ln>
             <a:extLst>
               <a:ext uri="{91240B29-F687-4f45-9708-019B960494DF}">
-                <a14:hiddenLine xmlns:a14="http://schemas.microsoft.com/office/drawing/2010/main" xmlns="" w="9525">
+                <a14:hiddenLine xmlns="" xmlns:a14="http://schemas.microsoft.com/office/drawing/2010/main" w="9525">
                   <a:solidFill>
                     <a:schemeClr val="tx1"/>
                   </a:solidFill>
@@ -5108,7 +5108,7 @@
             </a:ln>
             <a:extLst>
               <a:ext uri="{91240B29-F687-4f45-9708-019B960494DF}">
-                <a14:hiddenLine xmlns:a14="http://schemas.microsoft.com/office/drawing/2010/main" xmlns="" w="9525">
+                <a14:hiddenLine xmlns="" xmlns:a14="http://schemas.microsoft.com/office/drawing/2010/main" w="9525">
                   <a:solidFill>
                     <a:schemeClr val="tx1"/>
                   </a:solidFill>
@@ -5272,14 +5272,14 @@
           </a:ln>
           <a:extLst>
             <a:ext uri="{909E8E84-426E-40dd-AFC4-6F175D3DCCD1}">
-              <a14:hiddenFill xmlns:a14="http://schemas.microsoft.com/office/drawing/2010/main" xmlns="">
+              <a14:hiddenFill xmlns="" xmlns:a14="http://schemas.microsoft.com/office/drawing/2010/main">
                 <a:solidFill>
                   <a:srgbClr val="FFFFFF"/>
                 </a:solidFill>
               </a14:hiddenFill>
             </a:ext>
             <a:ext uri="{91240B29-F687-4f45-9708-019B960494DF}">
-              <a14:hiddenLine xmlns:a14="http://schemas.microsoft.com/office/drawing/2010/main" xmlns="" w="9525">
+              <a14:hiddenLine xmlns="" xmlns:a14="http://schemas.microsoft.com/office/drawing/2010/main" w="9525">
                 <a:solidFill>
                   <a:srgbClr val="000000"/>
                 </a:solidFill>
@@ -6273,14 +6273,14 @@
           <p:nvPr>
             <p:extLst>
               <p:ext uri="{D42A27DB-BD31-4B8C-83A1-F6EECF244321}">
-                <p14:modId xmlns:p14="http://schemas.microsoft.com/office/powerpoint/2010/main" val="3552036395"/>
+                <p14:modId xmlns:p14="http://schemas.microsoft.com/office/powerpoint/2010/main" val="139934650"/>
               </p:ext>
             </p:extLst>
           </p:nvPr>
         </p:nvGraphicFramePr>
         <p:xfrm>
           <a:off x="308667" y="1792981"/>
-          <a:ext cx="8171340" cy="4988926"/>
+          <a:ext cx="8171340" cy="4957443"/>
         </p:xfrm>
         <a:graphic>
           <a:graphicData uri="http://schemas.openxmlformats.org/drawingml/2006/table">
@@ -6506,7 +6506,7 @@
                     <a:p>
                       <a:r>
                         <a:rPr lang="en-US" dirty="0"/>
-                        <a:t>React, </a:t>
+                        <a:t>React</a:t>
                       </a:r>
                     </a:p>
                   </a:txBody>
@@ -6518,7 +6518,7 @@
                   </a:ext>
                 </a:extLst>
               </a:tr>
-              <a:tr h="759577">
+              <a:tr h="573271">
                 <a:tc>
                   <a:txBody>
                     <a:bodyPr/>
@@ -6557,7 +6557,7 @@
                     <a:p>
                       <a:r>
                         <a:rPr lang="en-US" dirty="0"/>
-                        <a:t>React, </a:t>
+                        <a:t>React</a:t>
                       </a:r>
                     </a:p>
                   </a:txBody>
@@ -6593,7 +6593,22 @@
                     <a:bodyPr/>
                     <a:lstStyle/>
                     <a:p>
-                      <a:endParaRPr lang="en-US"/>
+                      <a:r>
+                        <a:rPr lang="en-US" dirty="0" err="1"/>
+                        <a:t>Luova</a:t>
+                      </a:r>
+                      <a:r>
+                        <a:rPr lang="en-US" dirty="0"/>
+                        <a:t> </a:t>
+                      </a:r>
+                      <a:r>
+                        <a:rPr lang="en-US" dirty="0" err="1"/>
+                        <a:t>ajattelu</a:t>
+                      </a:r>
+                      <a:r>
+                        <a:rPr lang="en-US" dirty="0"/>
+                        <a:t>, UX</a:t>
+                      </a:r>
                     </a:p>
                   </a:txBody>
                   <a:tcPr/>
@@ -6603,6 +6618,50 @@
                     <a:bodyPr/>
                     <a:lstStyle/>
                     <a:p>
+                      <a:r>
+                        <a:rPr lang="en-US" dirty="0" err="1"/>
+                        <a:t>Saada</a:t>
+                      </a:r>
+                      <a:r>
+                        <a:rPr lang="en-US" dirty="0"/>
+                        <a:t> </a:t>
+                      </a:r>
+                      <a:r>
+                        <a:rPr lang="en-US" dirty="0" err="1"/>
+                        <a:t>muuta</a:t>
+                      </a:r>
+                      <a:r>
+                        <a:rPr lang="en-US" dirty="0"/>
+                        <a:t> </a:t>
+                      </a:r>
+                      <a:r>
+                        <a:rPr lang="en-US" dirty="0" err="1"/>
+                        <a:t>ryhmää</a:t>
+                      </a:r>
+                      <a:r>
+                        <a:rPr lang="en-US" dirty="0"/>
+                        <a:t> </a:t>
+                      </a:r>
+                      <a:r>
+                        <a:rPr lang="en-US" dirty="0" err="1"/>
+                        <a:t>kiinni</a:t>
+                      </a:r>
+                      <a:r>
+                        <a:rPr lang="en-US" dirty="0"/>
+                        <a:t> </a:t>
+                      </a:r>
+                      <a:r>
+                        <a:rPr lang="en-US" dirty="0" err="1"/>
+                        <a:t>teknisessä</a:t>
+                      </a:r>
+                      <a:r>
+                        <a:rPr lang="en-US" dirty="0"/>
+                        <a:t> </a:t>
+                      </a:r>
+                      <a:r>
+                        <a:rPr lang="en-US" dirty="0" err="1"/>
+                        <a:t>osaamisessa</a:t>
+                      </a:r>
                       <a:endParaRPr lang="en-US" dirty="0"/>
                     </a:p>
                   </a:txBody>
@@ -6647,9 +6706,10 @@
                     <a:lstStyle/>
                     <a:p>
                       <a:r>
-                        <a:rPr lang="en-US" dirty="0"/>
-                        <a:t>React,</a:t>
+                        <a:rPr lang="en-US"/>
+                        <a:t>React</a:t>
                       </a:r>
+                      <a:endParaRPr lang="en-US" dirty="0"/>
                     </a:p>
                   </a:txBody>
                   <a:tcPr/>
@@ -7840,15 +7900,7 @@
             </a:pPr>
             <a:r>
               <a:rPr lang="fi-FI" dirty="0"/>
-              <a:t>~ </a:t>
-            </a:r>
-            <a:r>
-              <a:rPr lang="fi-FI" dirty="0" err="1"/>
-              <a:t>x.y</a:t>
-            </a:r>
-            <a:r>
-              <a:rPr lang="fi-FI" dirty="0"/>
-              <a:t>.  	1. Sisäinen demo</a:t>
+              <a:t>To 8.2.  	1. Sisäinen demo</a:t>
             </a:r>
           </a:p>
           <a:p>
@@ -8492,7 +8544,7 @@
         <a:effectLst/>
         <a:extLst>
           <a:ext uri="{AF507438-7753-43e0-B8FC-AC1667EBCBE1}">
-            <a14:hiddenEffects xmlns:a14="http://schemas.microsoft.com/office/drawing/2010/main" xmlns="">
+            <a14:hiddenEffects xmlns="" xmlns:a14="http://schemas.microsoft.com/office/drawing/2010/main">
               <a:effectLst>
                 <a:outerShdw dist="35921" dir="2700000" algn="ctr" rotWithShape="0">
                   <a:schemeClr val="bg2"/>
@@ -8566,7 +8618,7 @@
         <a:effectLst/>
         <a:extLst>
           <a:ext uri="{AF507438-7753-43e0-B8FC-AC1667EBCBE1}">
-            <a14:hiddenEffects xmlns:a14="http://schemas.microsoft.com/office/drawing/2010/main" xmlns="">
+            <a14:hiddenEffects xmlns="" xmlns:a14="http://schemas.microsoft.com/office/drawing/2010/main">
               <a:effectLst>
                 <a:outerShdw dist="35921" dir="2700000" algn="ctr" rotWithShape="0">
                   <a:schemeClr val="bg2"/>

</xml_diff>